<commit_message>
Update AgendaLab tests to utilize the new hashcode
</commit_message>
<xml_diff>
--- a/doc/test/AgendaSlidesTextBeforeSync.pptx
+++ b/doc/test/AgendaSlidesTextBeforeSync.pptx
@@ -293,7 +293,7 @@
           <a:p>
             <a:fld id="{C33977A5-270E-4E03-B118-17345E304686}" type="datetimeFigureOut">
               <a:rPr lang="en-US" smtClean="0"/>
-              <a:t>24-Jun-15</a:t>
+              <a:t>25-Jun-15</a:t>
             </a:fld>
             <a:endParaRPr lang="en-US"/>
           </a:p>
@@ -606,10 +606,18 @@
           <a:lstStyle/>
           <a:p>
             <a:r>
-              <a:rPr lang="en-US" smtClean="0"/>
-              <a:t>This notes page is used to store data - Do not edit the notes. T2JqZWN0cyB3aXRoIHNhbWUgbmFtZQ==@VW5uYW1lZCBTaGFwZSAyMDE1MDYyNDE3MjAxMzM4NzkxNw==@VW5uYW1lZCBTaGFwZSAyMDE1MDYyNDE3MjAxMzM4NzkxOA==@VW5uYW1lZCBTaGFwZSAyMDE1MDYyNDE3MjAxMzM4MjkxNA==@UFBUVGVtcGxhdGVNYXJrZXI=@UHB0TGFic0FnZW5kYV8mXkBDb250ZW50U2hhcGVfJl5AMjAxNTA2MTkxNjI4Mzg3Nzg1MA==@VW5uYW1lZCBTaGFwZSAyMDE1MDYyNDE3MjAxMzM4NTkxNQ==@VW5uYW1lZCBTaGFwZSAyMDE1MDYyNDE3MjAxMzM4NzkxOQ==@VW5uYW1lZCBTaGFwZSAyMDE1MDYyNDE3MjAxMzM4NzkyMA==@VW5uYW1lZCBTaGFwZSAyMDE1MDYyNDE3MjAxMzM4ODkyMQ==@VW5uYW1lZCBTaGFwZSAyMDE1MDYyNDE3MjAxMzM4NzkxNg==@1765571851</a:t>
-            </a:r>
-            <a:endParaRPr lang="en-US"/>
+              <a:rPr lang="en-US" dirty="0" smtClean="0"/>
+              <a:t>This notes page is used to store data - Do not edit the notes. VW5uYW1lZCBTaGFwZSAyMDE1MDYyNDE3MjAxMzM4NzkxOQ==@VW5uYW1lZCBTaGFwZSAyMDE1MDYyNDE3MjAxMzM4NzkxNw==@VW5uYW1lZCBTaGFwZSAyMDE1MDYyNDE3MjAxMzM4ODkyMQ==@</a:t>
+            </a:r>
+            <a:r>
+              <a:rPr lang="en-US" dirty="0" err="1" smtClean="0"/>
+              <a:t>UFBUVGVtcGxhdGVNYXJrZXI</a:t>
+            </a:r>
+            <a:r>
+              <a:rPr lang="en-US" smtClean="0"/>
+              <a:t>=@UHB0TGFic0FnZW5kYV8mXkBDb250ZW50U2hhcGVfJl5AMjAxNTA2MTkxNjI4Mzg3Nzg1MA==@VW5uYW1lZCBTaGFwZSAyMDE1MDYyNDE3MjAxMzM4NTkxNQ==@VW5uYW1lZCBTaGFwZSAyMDE1MDYyNDE3MjAxMzM4MjkxNA==@T2JqZWN0cyB3aXRoIHNhbWUgbmFtZQ==@VW5uYW1lZCBTaGFwZSAyMDE1MDYyNDE3MjAxMzM4NzkxOA==@VW5uYW1lZCBTaGFwZSAyMDE1MDYyNDE3MjAxMzM4NzkyMA==@VW5uYW1lZCBTaGFwZSAyMDE1MDYyNDE3MjAxMzM4NzkxNg==@1159760725</a:t>
+            </a:r>
+            <a:endParaRPr lang="en-US" dirty="0"/>
           </a:p>
         </p:txBody>
       </p:sp>
@@ -830,7 +838,7 @@
           <a:p>
             <a:fld id="{699DC775-C286-4358-8C92-D7E584E969B3}" type="datetimeFigureOut">
               <a:rPr lang="en-US" smtClean="0"/>
-              <a:t>24-Jun-15</a:t>
+              <a:t>25-Jun-15</a:t>
             </a:fld>
             <a:endParaRPr lang="en-US"/>
           </a:p>
@@ -1000,7 +1008,7 @@
           <a:p>
             <a:fld id="{699DC775-C286-4358-8C92-D7E584E969B3}" type="datetimeFigureOut">
               <a:rPr lang="en-US" smtClean="0"/>
-              <a:t>24-Jun-15</a:t>
+              <a:t>25-Jun-15</a:t>
             </a:fld>
             <a:endParaRPr lang="en-US"/>
           </a:p>
@@ -1180,7 +1188,7 @@
           <a:p>
             <a:fld id="{699DC775-C286-4358-8C92-D7E584E969B3}" type="datetimeFigureOut">
               <a:rPr lang="en-US" smtClean="0"/>
-              <a:t>24-Jun-15</a:t>
+              <a:t>25-Jun-15</a:t>
             </a:fld>
             <a:endParaRPr lang="en-US"/>
           </a:p>
@@ -1350,7 +1358,7 @@
           <a:p>
             <a:fld id="{699DC775-C286-4358-8C92-D7E584E969B3}" type="datetimeFigureOut">
               <a:rPr lang="en-US" smtClean="0"/>
-              <a:t>24-Jun-15</a:t>
+              <a:t>25-Jun-15</a:t>
             </a:fld>
             <a:endParaRPr lang="en-US"/>
           </a:p>
@@ -1592,7 +1600,7 @@
           <a:p>
             <a:fld id="{699DC775-C286-4358-8C92-D7E584E969B3}" type="datetimeFigureOut">
               <a:rPr lang="en-US" smtClean="0"/>
-              <a:t>24-Jun-15</a:t>
+              <a:t>25-Jun-15</a:t>
             </a:fld>
             <a:endParaRPr lang="en-US"/>
           </a:p>
@@ -1762,7 +1770,7 @@
           <a:p>
             <a:fld id="{699DC775-C286-4358-8C92-D7E584E969B3}" type="datetimeFigureOut">
               <a:rPr lang="en-US" smtClean="0"/>
-              <a:t>24-Jun-15</a:t>
+              <a:t>25-Jun-15</a:t>
             </a:fld>
             <a:endParaRPr lang="en-US"/>
           </a:p>
@@ -2008,7 +2016,7 @@
           <a:p>
             <a:fld id="{699DC775-C286-4358-8C92-D7E584E969B3}" type="datetimeFigureOut">
               <a:rPr lang="en-US" smtClean="0"/>
-              <a:t>24-Jun-15</a:t>
+              <a:t>25-Jun-15</a:t>
             </a:fld>
             <a:endParaRPr lang="en-US"/>
           </a:p>
@@ -2296,7 +2304,7 @@
           <a:p>
             <a:fld id="{699DC775-C286-4358-8C92-D7E584E969B3}" type="datetimeFigureOut">
               <a:rPr lang="en-US" smtClean="0"/>
-              <a:t>24-Jun-15</a:t>
+              <a:t>25-Jun-15</a:t>
             </a:fld>
             <a:endParaRPr lang="en-US"/>
           </a:p>
@@ -2718,7 +2726,7 @@
           <a:p>
             <a:fld id="{699DC775-C286-4358-8C92-D7E584E969B3}" type="datetimeFigureOut">
               <a:rPr lang="en-US" smtClean="0"/>
-              <a:t>24-Jun-15</a:t>
+              <a:t>25-Jun-15</a:t>
             </a:fld>
             <a:endParaRPr lang="en-US"/>
           </a:p>
@@ -2836,7 +2844,7 @@
           <a:p>
             <a:fld id="{699DC775-C286-4358-8C92-D7E584E969B3}" type="datetimeFigureOut">
               <a:rPr lang="en-US" smtClean="0"/>
-              <a:t>24-Jun-15</a:t>
+              <a:t>25-Jun-15</a:t>
             </a:fld>
             <a:endParaRPr lang="en-US"/>
           </a:p>
@@ -2931,7 +2939,7 @@
           <a:p>
             <a:fld id="{699DC775-C286-4358-8C92-D7E584E969B3}" type="datetimeFigureOut">
               <a:rPr lang="en-US" smtClean="0"/>
-              <a:t>24-Jun-15</a:t>
+              <a:t>25-Jun-15</a:t>
             </a:fld>
             <a:endParaRPr lang="en-US"/>
           </a:p>
@@ -3101,7 +3109,7 @@
           <a:p>
             <a:fld id="{699DC775-C286-4358-8C92-D7E584E969B3}" type="datetimeFigureOut">
               <a:rPr lang="en-US" smtClean="0"/>
-              <a:t>24-Jun-15</a:t>
+              <a:t>25-Jun-15</a:t>
             </a:fld>
             <a:endParaRPr lang="en-US"/>
           </a:p>
@@ -3378,7 +3386,7 @@
           <a:p>
             <a:fld id="{699DC775-C286-4358-8C92-D7E584E969B3}" type="datetimeFigureOut">
               <a:rPr lang="en-US" smtClean="0"/>
-              <a:t>24-Jun-15</a:t>
+              <a:t>25-Jun-15</a:t>
             </a:fld>
             <a:endParaRPr lang="en-US"/>
           </a:p>
@@ -3631,7 +3639,7 @@
           <a:p>
             <a:fld id="{699DC775-C286-4358-8C92-D7E584E969B3}" type="datetimeFigureOut">
               <a:rPr lang="en-US" smtClean="0"/>
-              <a:t>24-Jun-15</a:t>
+              <a:t>25-Jun-15</a:t>
             </a:fld>
             <a:endParaRPr lang="en-US"/>
           </a:p>
@@ -3801,7 +3809,7 @@
           <a:p>
             <a:fld id="{699DC775-C286-4358-8C92-D7E584E969B3}" type="datetimeFigureOut">
               <a:rPr lang="en-US" smtClean="0"/>
-              <a:t>24-Jun-15</a:t>
+              <a:t>25-Jun-15</a:t>
             </a:fld>
             <a:endParaRPr lang="en-US"/>
           </a:p>
@@ -3981,7 +3989,7 @@
           <a:p>
             <a:fld id="{699DC775-C286-4358-8C92-D7E584E969B3}" type="datetimeFigureOut">
               <a:rPr lang="en-US" smtClean="0"/>
-              <a:t>24-Jun-15</a:t>
+              <a:t>25-Jun-15</a:t>
             </a:fld>
             <a:endParaRPr lang="en-US"/>
           </a:p>
@@ -4151,7 +4159,7 @@
           <a:p>
             <a:fld id="{699DC775-C286-4358-8C92-D7E584E969B3}" type="datetimeFigureOut">
               <a:rPr lang="en-US" smtClean="0"/>
-              <a:t>24-Jun-15</a:t>
+              <a:t>25-Jun-15</a:t>
             </a:fld>
             <a:endParaRPr lang="en-US"/>
           </a:p>
@@ -4401,7 +4409,7 @@
           <a:p>
             <a:fld id="{699DC775-C286-4358-8C92-D7E584E969B3}" type="datetimeFigureOut">
               <a:rPr lang="en-US" smtClean="0"/>
-              <a:t>24-Jun-15</a:t>
+              <a:t>25-Jun-15</a:t>
             </a:fld>
             <a:endParaRPr lang="en-US"/>
           </a:p>
@@ -4579,7 +4587,7 @@
           <a:p>
             <a:fld id="{699DC775-C286-4358-8C92-D7E584E969B3}" type="datetimeFigureOut">
               <a:rPr lang="en-US" smtClean="0"/>
-              <a:t>24-Jun-15</a:t>
+              <a:t>25-Jun-15</a:t>
             </a:fld>
             <a:endParaRPr lang="en-US"/>
           </a:p>
@@ -4833,7 +4841,7 @@
           <a:p>
             <a:fld id="{699DC775-C286-4358-8C92-D7E584E969B3}" type="datetimeFigureOut">
               <a:rPr lang="en-US" smtClean="0"/>
-              <a:t>24-Jun-15</a:t>
+              <a:t>25-Jun-15</a:t>
             </a:fld>
             <a:endParaRPr lang="en-US"/>
           </a:p>
@@ -5129,7 +5137,7 @@
           <a:p>
             <a:fld id="{699DC775-C286-4358-8C92-D7E584E969B3}" type="datetimeFigureOut">
               <a:rPr lang="en-US" smtClean="0"/>
-              <a:t>24-Jun-15</a:t>
+              <a:t>25-Jun-15</a:t>
             </a:fld>
             <a:endParaRPr lang="en-US"/>
           </a:p>
@@ -5559,7 +5567,7 @@
           <a:p>
             <a:fld id="{699DC775-C286-4358-8C92-D7E584E969B3}" type="datetimeFigureOut">
               <a:rPr lang="en-US" smtClean="0"/>
-              <a:t>24-Jun-15</a:t>
+              <a:t>25-Jun-15</a:t>
             </a:fld>
             <a:endParaRPr lang="en-US"/>
           </a:p>
@@ -5805,7 +5813,7 @@
           <a:p>
             <a:fld id="{699DC775-C286-4358-8C92-D7E584E969B3}" type="datetimeFigureOut">
               <a:rPr lang="en-US" smtClean="0"/>
-              <a:t>24-Jun-15</a:t>
+              <a:t>25-Jun-15</a:t>
             </a:fld>
             <a:endParaRPr lang="en-US"/>
           </a:p>
@@ -5931,7 +5939,7 @@
           <a:p>
             <a:fld id="{699DC775-C286-4358-8C92-D7E584E969B3}" type="datetimeFigureOut">
               <a:rPr lang="en-US" smtClean="0"/>
-              <a:t>24-Jun-15</a:t>
+              <a:t>25-Jun-15</a:t>
             </a:fld>
             <a:endParaRPr lang="en-US"/>
           </a:p>
@@ -6034,7 +6042,7 @@
           <a:p>
             <a:fld id="{699DC775-C286-4358-8C92-D7E584E969B3}" type="datetimeFigureOut">
               <a:rPr lang="en-US" smtClean="0"/>
-              <a:t>24-Jun-15</a:t>
+              <a:t>25-Jun-15</a:t>
             </a:fld>
             <a:endParaRPr lang="en-US"/>
           </a:p>
@@ -6319,7 +6327,7 @@
           <a:p>
             <a:fld id="{699DC775-C286-4358-8C92-D7E584E969B3}" type="datetimeFigureOut">
               <a:rPr lang="en-US" smtClean="0"/>
-              <a:t>24-Jun-15</a:t>
+              <a:t>25-Jun-15</a:t>
             </a:fld>
             <a:endParaRPr lang="en-US"/>
           </a:p>
@@ -6580,7 +6588,7 @@
           <a:p>
             <a:fld id="{699DC775-C286-4358-8C92-D7E584E969B3}" type="datetimeFigureOut">
               <a:rPr lang="en-US" smtClean="0"/>
-              <a:t>24-Jun-15</a:t>
+              <a:t>25-Jun-15</a:t>
             </a:fld>
             <a:endParaRPr lang="en-US"/>
           </a:p>
@@ -6758,7 +6766,7 @@
           <a:p>
             <a:fld id="{699DC775-C286-4358-8C92-D7E584E969B3}" type="datetimeFigureOut">
               <a:rPr lang="en-US" smtClean="0"/>
-              <a:t>24-Jun-15</a:t>
+              <a:t>25-Jun-15</a:t>
             </a:fld>
             <a:endParaRPr lang="en-US"/>
           </a:p>
@@ -6946,7 +6954,7 @@
           <a:p>
             <a:fld id="{699DC775-C286-4358-8C92-D7E584E969B3}" type="datetimeFigureOut">
               <a:rPr lang="en-US" smtClean="0"/>
-              <a:t>24-Jun-15</a:t>
+              <a:t>25-Jun-15</a:t>
             </a:fld>
             <a:endParaRPr lang="en-US"/>
           </a:p>
@@ -7116,7 +7124,7 @@
           <a:p>
             <a:fld id="{699DC775-C286-4358-8C92-D7E584E969B3}" type="datetimeFigureOut">
               <a:rPr lang="en-US" smtClean="0"/>
-              <a:t>24-Jun-15</a:t>
+              <a:t>25-Jun-15</a:t>
             </a:fld>
             <a:endParaRPr lang="en-US"/>
           </a:p>
@@ -7404,7 +7412,7 @@
           <a:p>
             <a:fld id="{699DC775-C286-4358-8C92-D7E584E969B3}" type="datetimeFigureOut">
               <a:rPr lang="en-US" smtClean="0"/>
-              <a:t>24-Jun-15</a:t>
+              <a:t>25-Jun-15</a:t>
             </a:fld>
             <a:endParaRPr lang="en-US"/>
           </a:p>
@@ -7826,7 +7834,7 @@
           <a:p>
             <a:fld id="{699DC775-C286-4358-8C92-D7E584E969B3}" type="datetimeFigureOut">
               <a:rPr lang="en-US" smtClean="0"/>
-              <a:t>24-Jun-15</a:t>
+              <a:t>25-Jun-15</a:t>
             </a:fld>
             <a:endParaRPr lang="en-US"/>
           </a:p>
@@ -7944,7 +7952,7 @@
           <a:p>
             <a:fld id="{699DC775-C286-4358-8C92-D7E584E969B3}" type="datetimeFigureOut">
               <a:rPr lang="en-US" smtClean="0"/>
-              <a:t>24-Jun-15</a:t>
+              <a:t>25-Jun-15</a:t>
             </a:fld>
             <a:endParaRPr lang="en-US"/>
           </a:p>
@@ -8039,7 +8047,7 @@
           <a:p>
             <a:fld id="{699DC775-C286-4358-8C92-D7E584E969B3}" type="datetimeFigureOut">
               <a:rPr lang="en-US" smtClean="0"/>
-              <a:t>24-Jun-15</a:t>
+              <a:t>25-Jun-15</a:t>
             </a:fld>
             <a:endParaRPr lang="en-US"/>
           </a:p>
@@ -8316,7 +8324,7 @@
           <a:p>
             <a:fld id="{699DC775-C286-4358-8C92-D7E584E969B3}" type="datetimeFigureOut">
               <a:rPr lang="en-US" smtClean="0"/>
-              <a:t>24-Jun-15</a:t>
+              <a:t>25-Jun-15</a:t>
             </a:fld>
             <a:endParaRPr lang="en-US"/>
           </a:p>
@@ -8569,7 +8577,7 @@
           <a:p>
             <a:fld id="{699DC775-C286-4358-8C92-D7E584E969B3}" type="datetimeFigureOut">
               <a:rPr lang="en-US" smtClean="0"/>
-              <a:t>24-Jun-15</a:t>
+              <a:t>25-Jun-15</a:t>
             </a:fld>
             <a:endParaRPr lang="en-US"/>
           </a:p>
@@ -8782,7 +8790,7 @@
           <a:p>
             <a:fld id="{699DC775-C286-4358-8C92-D7E584E969B3}" type="datetimeFigureOut">
               <a:rPr lang="en-US" smtClean="0"/>
-              <a:t>24-Jun-15</a:t>
+              <a:t>25-Jun-15</a:t>
             </a:fld>
             <a:endParaRPr lang="en-US"/>
           </a:p>
@@ -9298,7 +9306,7 @@
           <a:p>
             <a:fld id="{699DC775-C286-4358-8C92-D7E584E969B3}" type="datetimeFigureOut">
               <a:rPr lang="en-US" smtClean="0"/>
-              <a:t>24-Jun-15</a:t>
+              <a:t>25-Jun-15</a:t>
             </a:fld>
             <a:endParaRPr lang="en-US"/>
           </a:p>
@@ -9812,7 +9820,7 @@
           <a:p>
             <a:fld id="{699DC775-C286-4358-8C92-D7E584E969B3}" type="datetimeFigureOut">
               <a:rPr lang="en-US" smtClean="0"/>
-              <a:t>24-Jun-15</a:t>
+              <a:t>25-Jun-15</a:t>
             </a:fld>
             <a:endParaRPr lang="en-US"/>
           </a:p>
@@ -10638,11 +10646,6 @@
               </a:rPr>
               <a:t>Such Fun!</a:t>
             </a:r>
-            <a:endParaRPr lang="en-US" sz="3600" dirty="0" smtClean="0">
-              <a:solidFill>
-                <a:srgbClr val="0070C0"/>
-              </a:solidFill>
-            </a:endParaRPr>
           </a:p>
           <a:p>
             <a:r>
@@ -11770,13 +11773,13 @@
   <p:clrMapOvr>
     <a:masterClrMapping/>
   </p:clrMapOvr>
-  <mc:AlternateContent xmlns:mc="http://schemas.openxmlformats.org/markup-compatibility/2006">
-    <mc:Choice xmlns:p14="http://schemas.microsoft.com/office/powerpoint/2010/main" Requires="p14">
+  <mc:AlternateContent xmlns:mc="http://schemas.openxmlformats.org/markup-compatibility/2006" xmlns:p14="http://schemas.microsoft.com/office/powerpoint/2010/main">
+    <mc:Choice Requires="p14">
       <p:transition p14:dur="250">
         <p:fade/>
       </p:transition>
     </mc:Choice>
-    <mc:Fallback>
+    <mc:Fallback xmlns="">
       <p:transition>
         <p:fade/>
       </p:transition>
@@ -12721,13 +12724,13 @@
   <p:clrMapOvr>
     <a:masterClrMapping/>
   </p:clrMapOvr>
-  <mc:AlternateContent xmlns:mc="http://schemas.openxmlformats.org/markup-compatibility/2006">
-    <mc:Choice xmlns:p14="http://schemas.microsoft.com/office/powerpoint/2010/main" Requires="p14">
+  <mc:AlternateContent xmlns:mc="http://schemas.openxmlformats.org/markup-compatibility/2006" xmlns:p14="http://schemas.microsoft.com/office/powerpoint/2010/main">
+    <mc:Choice Requires="p14">
       <p:transition p14:dur="250">
         <p:fade/>
       </p:transition>
     </mc:Choice>
-    <mc:Fallback>
+    <mc:Fallback xmlns="">
       <p:transition>
         <p:fade/>
       </p:transition>
@@ -14099,13 +14102,13 @@
   <p:clrMapOvr>
     <a:masterClrMapping/>
   </p:clrMapOvr>
-  <mc:AlternateContent xmlns:mc="http://schemas.openxmlformats.org/markup-compatibility/2006">
-    <mc:Choice xmlns:p14="http://schemas.microsoft.com/office/powerpoint/2010/main" Requires="p14">
+  <mc:AlternateContent xmlns:mc="http://schemas.openxmlformats.org/markup-compatibility/2006" xmlns:p14="http://schemas.microsoft.com/office/powerpoint/2010/main">
+    <mc:Choice Requires="p14">
       <p:transition p14:dur="250">
         <p:fade/>
       </p:transition>
     </mc:Choice>
-    <mc:Fallback>
+    <mc:Fallback xmlns="">
       <p:transition>
         <p:fade/>
       </p:transition>
@@ -15042,13 +15045,13 @@
   <p:clrMapOvr>
     <a:masterClrMapping/>
   </p:clrMapOvr>
-  <mc:AlternateContent xmlns:mc="http://schemas.openxmlformats.org/markup-compatibility/2006">
-    <mc:Choice xmlns:p14="http://schemas.microsoft.com/office/powerpoint/2010/main" Requires="p14">
+  <mc:AlternateContent xmlns:mc="http://schemas.openxmlformats.org/markup-compatibility/2006" xmlns:p14="http://schemas.microsoft.com/office/powerpoint/2010/main">
+    <mc:Choice Requires="p14">
       <p:transition p14:dur="250">
         <p:fade/>
       </p:transition>
     </mc:Choice>
-    <mc:Fallback>
+    <mc:Fallback xmlns="">
       <p:transition>
         <p:fade/>
       </p:transition>
@@ -16363,13 +16366,13 @@
   <p:clrMapOvr>
     <a:masterClrMapping/>
   </p:clrMapOvr>
-  <mc:AlternateContent xmlns:mc="http://schemas.openxmlformats.org/markup-compatibility/2006">
-    <mc:Choice xmlns:p14="http://schemas.microsoft.com/office/powerpoint/2010/main" Requires="p14">
+  <mc:AlternateContent xmlns:mc="http://schemas.openxmlformats.org/markup-compatibility/2006" xmlns:p14="http://schemas.microsoft.com/office/powerpoint/2010/main">
+    <mc:Choice Requires="p14">
       <p:transition p14:dur="250">
         <p:fade/>
       </p:transition>
     </mc:Choice>
-    <mc:Fallback>
+    <mc:Fallback xmlns="">
       <p:transition>
         <p:fade/>
       </p:transition>
@@ -17124,13 +17127,13 @@
   <p:clrMapOvr>
     <a:masterClrMapping/>
   </p:clrMapOvr>
-  <mc:AlternateContent xmlns:mc="http://schemas.openxmlformats.org/markup-compatibility/2006">
-    <mc:Choice xmlns:p14="http://schemas.microsoft.com/office/powerpoint/2010/main" Requires="p14">
+  <mc:AlternateContent xmlns:mc="http://schemas.openxmlformats.org/markup-compatibility/2006" xmlns:p14="http://schemas.microsoft.com/office/powerpoint/2010/main">
+    <mc:Choice Requires="p14">
       <p:transition p14:dur="250">
         <p:fade/>
       </p:transition>
     </mc:Choice>
-    <mc:Fallback>
+    <mc:Fallback xmlns="">
       <p:transition>
         <p:fade/>
       </p:transition>
@@ -17886,13 +17889,13 @@
   <p:clrMapOvr>
     <a:masterClrMapping/>
   </p:clrMapOvr>
-  <mc:AlternateContent xmlns:mc="http://schemas.openxmlformats.org/markup-compatibility/2006">
-    <mc:Choice xmlns:p14="http://schemas.microsoft.com/office/powerpoint/2010/main" Requires="p14">
+  <mc:AlternateContent xmlns:mc="http://schemas.openxmlformats.org/markup-compatibility/2006" xmlns:p14="http://schemas.microsoft.com/office/powerpoint/2010/main">
+    <mc:Choice Requires="p14">
       <p:transition p14:dur="250">
         <p:fade/>
       </p:transition>
     </mc:Choice>
-    <mc:Fallback>
+    <mc:Fallback xmlns="">
       <p:transition>
         <p:fade/>
       </p:transition>
@@ -18063,11 +18066,11 @@
   <p:clrMapOvr>
     <a:masterClrMapping/>
   </p:clrMapOvr>
-  <mc:AlternateContent xmlns:mc="http://schemas.openxmlformats.org/markup-compatibility/2006">
-    <mc:Choice xmlns:p14="http://schemas.microsoft.com/office/powerpoint/2010/main" Requires="p14">
+  <mc:AlternateContent xmlns:mc="http://schemas.openxmlformats.org/markup-compatibility/2006" xmlns:p14="http://schemas.microsoft.com/office/powerpoint/2010/main">
+    <mc:Choice Requires="p14">
       <p:transition spd="slow" p14:dur="2000"/>
     </mc:Choice>
-    <mc:Fallback>
+    <mc:Fallback xmlns="">
       <p:transition spd="slow"/>
     </mc:Fallback>
   </mc:AlternateContent>
@@ -18942,13 +18945,13 @@
   <p:clrMapOvr>
     <a:masterClrMapping/>
   </p:clrMapOvr>
-  <mc:AlternateContent xmlns:mc="http://schemas.openxmlformats.org/markup-compatibility/2006">
-    <mc:Choice xmlns:p14="http://schemas.microsoft.com/office/powerpoint/2010/main" Requires="p14">
+  <mc:AlternateContent xmlns:mc="http://schemas.openxmlformats.org/markup-compatibility/2006" xmlns:p14="http://schemas.microsoft.com/office/powerpoint/2010/main">
+    <mc:Choice Requires="p14">
       <p:transition p14:dur="250">
         <p:fade/>
       </p:transition>
     </mc:Choice>
-    <mc:Fallback>
+    <mc:Fallback xmlns="">
       <p:transition>
         <p:fade/>
       </p:transition>
@@ -20090,13 +20093,13 @@
   <p:clrMapOvr>
     <a:masterClrMapping/>
   </p:clrMapOvr>
-  <mc:AlternateContent xmlns:mc="http://schemas.openxmlformats.org/markup-compatibility/2006">
-    <mc:Choice xmlns:p14="http://schemas.microsoft.com/office/powerpoint/2010/main" Requires="p14">
+  <mc:AlternateContent xmlns:mc="http://schemas.openxmlformats.org/markup-compatibility/2006" xmlns:p14="http://schemas.microsoft.com/office/powerpoint/2010/main">
+    <mc:Choice Requires="p14">
       <p:transition p14:dur="250">
         <p:fade/>
       </p:transition>
     </mc:Choice>
-    <mc:Fallback>
+    <mc:Fallback xmlns="">
       <p:transition>
         <p:fade/>
       </p:transition>
@@ -20935,13 +20938,13 @@
   <p:clrMapOvr>
     <a:masterClrMapping/>
   </p:clrMapOvr>
-  <mc:AlternateContent xmlns:mc="http://schemas.openxmlformats.org/markup-compatibility/2006">
-    <mc:Choice xmlns:p14="http://schemas.microsoft.com/office/powerpoint/2010/main" Requires="p14">
+  <mc:AlternateContent xmlns:mc="http://schemas.openxmlformats.org/markup-compatibility/2006" xmlns:p14="http://schemas.microsoft.com/office/powerpoint/2010/main">
+    <mc:Choice Requires="p14">
       <p:transition p14:dur="250">
         <p:fade/>
       </p:transition>
     </mc:Choice>
-    <mc:Fallback>
+    <mc:Fallback xmlns="">
       <p:transition>
         <p:fade/>
       </p:transition>
@@ -21999,13 +22002,13 @@
   <p:clrMapOvr>
     <a:masterClrMapping/>
   </p:clrMapOvr>
-  <mc:AlternateContent xmlns:mc="http://schemas.openxmlformats.org/markup-compatibility/2006">
-    <mc:Choice xmlns:p14="http://schemas.microsoft.com/office/powerpoint/2010/main" Requires="p14">
+  <mc:AlternateContent xmlns:mc="http://schemas.openxmlformats.org/markup-compatibility/2006" xmlns:p14="http://schemas.microsoft.com/office/powerpoint/2010/main">
+    <mc:Choice Requires="p14">
       <p:transition p14:dur="250">
         <p:fade/>
       </p:transition>
     </mc:Choice>
-    <mc:Fallback>
+    <mc:Fallback xmlns="">
       <p:transition>
         <p:fade/>
       </p:transition>
@@ -23009,13 +23012,13 @@
   <p:clrMapOvr>
     <a:masterClrMapping/>
   </p:clrMapOvr>
-  <mc:AlternateContent xmlns:mc="http://schemas.openxmlformats.org/markup-compatibility/2006">
-    <mc:Choice xmlns:p14="http://schemas.microsoft.com/office/powerpoint/2010/main" Requires="p14">
+  <mc:AlternateContent xmlns:mc="http://schemas.openxmlformats.org/markup-compatibility/2006" xmlns:p14="http://schemas.microsoft.com/office/powerpoint/2010/main">
+    <mc:Choice Requires="p14">
       <p:transition p14:dur="250">
         <p:fade/>
       </p:transition>
     </mc:Choice>
-    <mc:Fallback>
+    <mc:Fallback xmlns="">
       <p:transition>
         <p:fade/>
       </p:transition>

</xml_diff>